<commit_message>
parametric bootstrap and update cheat sheet
</commit_message>
<xml_diff>
--- a/img_readme/cheat_sheet_spINAR.pptx
+++ b/img_readme/cheat_sheet_spINAR.pptx
@@ -2124,7 +2124,7 @@
           </a:ln>
           <a:extLst>
             <a:ext uri="{C572A759-6A51-4108-AA02-DFA0A04FC94B}">
-              <ma14:wrappingTextBoxFlag xmlns="" xmlns:m="http://schemas.openxmlformats.org/officeDocument/2006/math" xmlns:a14="http://schemas.microsoft.com/office/drawing/2010/main" xmlns:ma14="http://schemas.microsoft.com/office/mac/drawingml/2011/main" val="1"/>
+              <ma14:wrappingTextBoxFlag xmlns:ma14="http://schemas.microsoft.com/office/mac/drawingml/2011/main" xmlns:a14="http://schemas.microsoft.com/office/drawing/2010/main" xmlns:m="http://schemas.openxmlformats.org/officeDocument/2006/math" xmlns="" val="1"/>
             </a:ext>
           </a:extLst>
         </p:spPr>
@@ -2163,7 +2163,7 @@
           </a:ln>
           <a:extLst>
             <a:ext uri="{C572A759-6A51-4108-AA02-DFA0A04FC94B}">
-              <ma14:wrappingTextBoxFlag xmlns="" xmlns:m="http://schemas.openxmlformats.org/officeDocument/2006/math" xmlns:a14="http://schemas.microsoft.com/office/drawing/2010/main" xmlns:ma14="http://schemas.microsoft.com/office/mac/drawingml/2011/main" val="1"/>
+              <ma14:wrappingTextBoxFlag xmlns:ma14="http://schemas.microsoft.com/office/mac/drawingml/2011/main" xmlns:a14="http://schemas.microsoft.com/office/drawing/2010/main" xmlns:m="http://schemas.openxmlformats.org/officeDocument/2006/math" xmlns="" val="1"/>
             </a:ext>
           </a:extLst>
         </p:spPr>
@@ -3256,7 +3256,7 @@
           </a:ln>
           <a:extLst>
             <a:ext uri="{C572A759-6A51-4108-AA02-DFA0A04FC94B}">
-              <ma14:wrappingTextBoxFlag xmlns="" xmlns:m="http://schemas.openxmlformats.org/officeDocument/2006/math" xmlns:a14="http://schemas.microsoft.com/office/drawing/2010/main" xmlns:ma14="http://schemas.microsoft.com/office/mac/drawingml/2011/main" val="1"/>
+              <ma14:wrappingTextBoxFlag xmlns:ma14="http://schemas.microsoft.com/office/mac/drawingml/2011/main" xmlns:a14="http://schemas.microsoft.com/office/drawing/2010/main" xmlns:m="http://schemas.openxmlformats.org/officeDocument/2006/math" xmlns="" val="1"/>
             </a:ext>
           </a:extLst>
         </p:spPr>
@@ -3306,7 +3306,7 @@
           </a:ln>
           <a:extLst>
             <a:ext uri="{C572A759-6A51-4108-AA02-DFA0A04FC94B}">
-              <ma14:wrappingTextBoxFlag xmlns="" xmlns:m="http://schemas.openxmlformats.org/officeDocument/2006/math" xmlns:a14="http://schemas.microsoft.com/office/drawing/2010/main" xmlns:ma14="http://schemas.microsoft.com/office/mac/drawingml/2011/main" val="1"/>
+              <ma14:wrappingTextBoxFlag xmlns:ma14="http://schemas.microsoft.com/office/mac/drawingml/2011/main" xmlns:a14="http://schemas.microsoft.com/office/drawing/2010/main" xmlns:m="http://schemas.openxmlformats.org/officeDocument/2006/math" xmlns="" val="1"/>
             </a:ext>
           </a:extLst>
         </p:spPr>
@@ -3352,7 +3352,7 @@
           </a:ln>
           <a:extLst>
             <a:ext uri="{C572A759-6A51-4108-AA02-DFA0A04FC94B}">
-              <ma14:wrappingTextBoxFlag xmlns="" xmlns:m="http://schemas.openxmlformats.org/officeDocument/2006/math" xmlns:a14="http://schemas.microsoft.com/office/drawing/2010/main" xmlns:ma14="http://schemas.microsoft.com/office/mac/drawingml/2011/main" val="1"/>
+              <ma14:wrappingTextBoxFlag xmlns:ma14="http://schemas.microsoft.com/office/mac/drawingml/2011/main" xmlns:a14="http://schemas.microsoft.com/office/drawing/2010/main" xmlns:m="http://schemas.openxmlformats.org/officeDocument/2006/math" xmlns="" val="1"/>
             </a:ext>
           </a:extLst>
         </p:spPr>
@@ -3415,13 +3415,7 @@
               <a:rPr lang="es-ES" i="1" dirty="0" smtClean="0">
                 <a:latin typeface="+mn-lt"/>
               </a:rPr>
-              <a:t>&gt; </a:t>
-            </a:r>
-            <a:r>
-              <a:rPr lang="es-ES" i="1" dirty="0" smtClean="0">
-                <a:latin typeface="+mn-lt"/>
-              </a:rPr>
-              <a:t>devtools</a:t>
+              <a:t>&gt; devtools</a:t>
             </a:r>
             <a:r>
               <a:rPr lang="es-ES" i="1" dirty="0">
@@ -3728,7 +3722,7 @@
           </a:ln>
           <a:extLst>
             <a:ext uri="{C572A759-6A51-4108-AA02-DFA0A04FC94B}">
-              <ma14:wrappingTextBoxFlag xmlns="" xmlns:m="http://schemas.openxmlformats.org/officeDocument/2006/math" xmlns:a14="http://schemas.microsoft.com/office/drawing/2010/main" xmlns:ma14="http://schemas.microsoft.com/office/mac/drawingml/2011/main" val="1"/>
+              <ma14:wrappingTextBoxFlag xmlns:ma14="http://schemas.microsoft.com/office/mac/drawingml/2011/main" xmlns:a14="http://schemas.microsoft.com/office/drawing/2010/main" xmlns:m="http://schemas.openxmlformats.org/officeDocument/2006/math" xmlns="" val="1"/>
             </a:ext>
           </a:extLst>
         </p:spPr>
@@ -3810,7 +3804,7 @@
           </a:ln>
           <a:extLst>
             <a:ext uri="{C572A759-6A51-4108-AA02-DFA0A04FC94B}">
-              <ma14:wrappingTextBoxFlag xmlns="" xmlns:m="http://schemas.openxmlformats.org/officeDocument/2006/math" xmlns:a14="http://schemas.microsoft.com/office/drawing/2010/main" xmlns:ma14="http://schemas.microsoft.com/office/mac/drawingml/2011/main" val="1"/>
+              <ma14:wrappingTextBoxFlag xmlns:ma14="http://schemas.microsoft.com/office/mac/drawingml/2011/main" xmlns:a14="http://schemas.microsoft.com/office/drawing/2010/main" xmlns:m="http://schemas.openxmlformats.org/officeDocument/2006/math" xmlns="" val="1"/>
             </a:ext>
           </a:extLst>
         </p:spPr>
@@ -3860,7 +3854,7 @@
           </a:ln>
           <a:extLst>
             <a:ext uri="{C572A759-6A51-4108-AA02-DFA0A04FC94B}">
-              <ma14:wrappingTextBoxFlag xmlns="" xmlns:m="http://schemas.openxmlformats.org/officeDocument/2006/math" xmlns:a14="http://schemas.microsoft.com/office/drawing/2010/main" xmlns:ma14="http://schemas.microsoft.com/office/mac/drawingml/2011/main" val="1"/>
+              <ma14:wrappingTextBoxFlag xmlns:ma14="http://schemas.microsoft.com/office/mac/drawingml/2011/main" xmlns:a14="http://schemas.microsoft.com/office/drawing/2010/main" xmlns:m="http://schemas.openxmlformats.org/officeDocument/2006/math" xmlns="" val="1"/>
             </a:ext>
           </a:extLst>
         </p:spPr>
@@ -3927,7 +3921,7 @@
           </a:ln>
           <a:extLst>
             <a:ext uri="{C572A759-6A51-4108-AA02-DFA0A04FC94B}">
-              <ma14:wrappingTextBoxFlag xmlns="" xmlns:m="http://schemas.openxmlformats.org/officeDocument/2006/math" xmlns:a14="http://schemas.microsoft.com/office/drawing/2010/main" xmlns:ma14="http://schemas.microsoft.com/office/mac/drawingml/2011/main" val="1"/>
+              <ma14:wrappingTextBoxFlag xmlns:ma14="http://schemas.microsoft.com/office/mac/drawingml/2011/main" xmlns:a14="http://schemas.microsoft.com/office/drawing/2010/main" xmlns:m="http://schemas.openxmlformats.org/officeDocument/2006/math" xmlns="" val="1"/>
             </a:ext>
           </a:extLst>
         </p:spPr>
@@ -4040,7 +4034,7 @@
           <a:effectLst/>
           <a:extLst>
             <a:ext uri="{C572A759-6A51-4108-AA02-DFA0A04FC94B}">
-              <ma14:wrappingTextBoxFlag xmlns="" xmlns:m="http://schemas.openxmlformats.org/officeDocument/2006/math" xmlns:a14="http://schemas.microsoft.com/office/drawing/2010/main" xmlns:ma14="http://schemas.microsoft.com/office/mac/drawingml/2011/main" val="1"/>
+              <ma14:wrappingTextBoxFlag xmlns:ma14="http://schemas.microsoft.com/office/mac/drawingml/2011/main" xmlns:a14="http://schemas.microsoft.com/office/drawing/2010/main" xmlns:m="http://schemas.openxmlformats.org/officeDocument/2006/math" xmlns="" val="1"/>
             </a:ext>
           </a:extLst>
         </p:spPr>
@@ -4150,7 +4144,7 @@
           </a:ln>
           <a:extLst>
             <a:ext uri="{C572A759-6A51-4108-AA02-DFA0A04FC94B}">
-              <ma14:wrappingTextBoxFlag xmlns="" xmlns:m="http://schemas.openxmlformats.org/officeDocument/2006/math" xmlns:a14="http://schemas.microsoft.com/office/drawing/2010/main" xmlns:ma14="http://schemas.microsoft.com/office/mac/drawingml/2011/main" val="1"/>
+              <ma14:wrappingTextBoxFlag xmlns:ma14="http://schemas.microsoft.com/office/mac/drawingml/2011/main" xmlns:a14="http://schemas.microsoft.com/office/drawing/2010/main" xmlns:m="http://schemas.openxmlformats.org/officeDocument/2006/math" xmlns="" val="1"/>
             </a:ext>
           </a:extLst>
         </p:spPr>
@@ -4206,7 +4200,7 @@
           </a:ln>
           <a:extLst>
             <a:ext uri="{C572A759-6A51-4108-AA02-DFA0A04FC94B}">
-              <ma14:wrappingTextBoxFlag xmlns="" xmlns:m="http://schemas.openxmlformats.org/officeDocument/2006/math" xmlns:a14="http://schemas.microsoft.com/office/drawing/2010/main" xmlns:ma14="http://schemas.microsoft.com/office/mac/drawingml/2011/main" val="1"/>
+              <ma14:wrappingTextBoxFlag xmlns:ma14="http://schemas.microsoft.com/office/mac/drawingml/2011/main" xmlns:a14="http://schemas.microsoft.com/office/drawing/2010/main" xmlns:m="http://schemas.openxmlformats.org/officeDocument/2006/math" xmlns="" val="1"/>
             </a:ext>
           </a:extLst>
         </p:spPr>
@@ -4262,7 +4256,7 @@
           </a:ln>
           <a:extLst>
             <a:ext uri="{C572A759-6A51-4108-AA02-DFA0A04FC94B}">
-              <ma14:wrappingTextBoxFlag xmlns="" xmlns:m="http://schemas.openxmlformats.org/officeDocument/2006/math" xmlns:a14="http://schemas.microsoft.com/office/drawing/2010/main" xmlns:ma14="http://schemas.microsoft.com/office/mac/drawingml/2011/main" val="1"/>
+              <ma14:wrappingTextBoxFlag xmlns:ma14="http://schemas.microsoft.com/office/mac/drawingml/2011/main" xmlns:a14="http://schemas.microsoft.com/office/drawing/2010/main" xmlns:m="http://schemas.openxmlformats.org/officeDocument/2006/math" xmlns="" val="1"/>
             </a:ext>
           </a:extLst>
         </p:spPr>
@@ -4349,7 +4343,7 @@
           <a:effectLst/>
           <a:extLst>
             <a:ext uri="{C572A759-6A51-4108-AA02-DFA0A04FC94B}">
-              <ma14:wrappingTextBoxFlag xmlns="" xmlns:m="http://schemas.openxmlformats.org/officeDocument/2006/math" xmlns:a14="http://schemas.microsoft.com/office/drawing/2010/main" xmlns:ma14="http://schemas.microsoft.com/office/mac/drawingml/2011/main" val="1"/>
+              <ma14:wrappingTextBoxFlag xmlns:ma14="http://schemas.microsoft.com/office/mac/drawingml/2011/main" xmlns:a14="http://schemas.microsoft.com/office/drawing/2010/main" xmlns:m="http://schemas.openxmlformats.org/officeDocument/2006/math" xmlns="" val="1"/>
             </a:ext>
           </a:extLst>
         </p:spPr>
@@ -4632,7 +4626,7 @@
           <a:effectLst/>
           <a:extLst>
             <a:ext uri="{C572A759-6A51-4108-AA02-DFA0A04FC94B}">
-              <ma14:wrappingTextBoxFlag xmlns="" xmlns:m="http://schemas.openxmlformats.org/officeDocument/2006/math" xmlns:a14="http://schemas.microsoft.com/office/drawing/2010/main" xmlns:ma14="http://schemas.microsoft.com/office/mac/drawingml/2011/main" val="1"/>
+              <ma14:wrappingTextBoxFlag xmlns:ma14="http://schemas.microsoft.com/office/mac/drawingml/2011/main" xmlns:a14="http://schemas.microsoft.com/office/drawing/2010/main" xmlns:m="http://schemas.openxmlformats.org/officeDocument/2006/math" xmlns="" val="1"/>
             </a:ext>
           </a:extLst>
         </p:spPr>
@@ -4674,17 +4668,7 @@
                 <a:latin typeface="Source Sans Pro" panose="020B0503030403020204" pitchFamily="34" charset="0"/>
                 <a:ea typeface="Source Sans Pro" panose="020B0503030403020204" pitchFamily="34" charset="0"/>
               </a:rPr>
-              <a:t>O</a:t>
-            </a:r>
-            <a:r>
-              <a:rPr lang="en-US" sz="1400" dirty="0" smtClean="0">
-                <a:solidFill>
-                  <a:schemeClr val="tx1"/>
-                </a:solidFill>
-                <a:latin typeface="Source Sans Pro" panose="020B0503030403020204" pitchFamily="34" charset="0"/>
-                <a:ea typeface="Source Sans Pro" panose="020B0503030403020204" pitchFamily="34" charset="0"/>
-              </a:rPr>
-              <a:t>utput: </a:t>
+              <a:t>Output: </a:t>
             </a:r>
             <a:r>
               <a:rPr lang="en-US" sz="1400" b="0" dirty="0" smtClean="0">
@@ -4736,7 +4720,7 @@
           <a:effectLst/>
           <a:extLst>
             <a:ext uri="{C572A759-6A51-4108-AA02-DFA0A04FC94B}">
-              <ma14:wrappingTextBoxFlag xmlns="" xmlns:m="http://schemas.openxmlformats.org/officeDocument/2006/math" xmlns:a14="http://schemas.microsoft.com/office/drawing/2010/main" xmlns:ma14="http://schemas.microsoft.com/office/mac/drawingml/2011/main" val="1"/>
+              <ma14:wrappingTextBoxFlag xmlns:ma14="http://schemas.microsoft.com/office/mac/drawingml/2011/main" xmlns:a14="http://schemas.microsoft.com/office/drawing/2010/main" xmlns:m="http://schemas.openxmlformats.org/officeDocument/2006/math" xmlns="" val="1"/>
             </a:ext>
           </a:extLst>
         </p:spPr>
@@ -4855,7 +4839,7 @@
           </a:ln>
           <a:extLst>
             <a:ext uri="{C572A759-6A51-4108-AA02-DFA0A04FC94B}">
-              <ma14:wrappingTextBoxFlag xmlns="" xmlns:m="http://schemas.openxmlformats.org/officeDocument/2006/math" xmlns:a14="http://schemas.microsoft.com/office/drawing/2010/main" xmlns:ma14="http://schemas.microsoft.com/office/mac/drawingml/2011/main" val="1"/>
+              <ma14:wrappingTextBoxFlag xmlns:ma14="http://schemas.microsoft.com/office/mac/drawingml/2011/main" xmlns:a14="http://schemas.microsoft.com/office/drawing/2010/main" xmlns:m="http://schemas.openxmlformats.org/officeDocument/2006/math" xmlns="" val="1"/>
             </a:ext>
           </a:extLst>
         </p:spPr>
@@ -4925,7 +4909,7 @@
           </a:ln>
           <a:extLst>
             <a:ext uri="{C572A759-6A51-4108-AA02-DFA0A04FC94B}">
-              <ma14:wrappingTextBoxFlag xmlns="" xmlns:m="http://schemas.openxmlformats.org/officeDocument/2006/math" xmlns:a14="http://schemas.microsoft.com/office/drawing/2010/main" xmlns:ma14="http://schemas.microsoft.com/office/mac/drawingml/2011/main" val="1"/>
+              <ma14:wrappingTextBoxFlag xmlns:ma14="http://schemas.microsoft.com/office/mac/drawingml/2011/main" xmlns:a14="http://schemas.microsoft.com/office/drawing/2010/main" xmlns:m="http://schemas.openxmlformats.org/officeDocument/2006/math" xmlns="" val="1"/>
             </a:ext>
           </a:extLst>
         </p:spPr>
@@ -4957,17 +4941,7 @@
                   </a:schemeClr>
                 </a:solidFill>
               </a:rPr>
-              <a:t>spinar</a:t>
-            </a:r>
-            <a:r>
-              <a:rPr lang="es-ES" dirty="0" smtClean="0">
-                <a:solidFill>
-                  <a:schemeClr val="tx1">
-                    <a:lumMod val="50000"/>
-                  </a:schemeClr>
-                </a:solidFill>
-              </a:rPr>
-              <a:t>_est_param</a:t>
+              <a:t>spinar_est_param</a:t>
             </a:r>
             <a:r>
               <a:rPr dirty="0" smtClean="0">
@@ -5088,7 +5062,7 @@
           </a:ln>
           <a:extLst>
             <a:ext uri="{C572A759-6A51-4108-AA02-DFA0A04FC94B}">
-              <ma14:wrappingTextBoxFlag xmlns="" xmlns:m="http://schemas.openxmlformats.org/officeDocument/2006/math" xmlns:a14="http://schemas.microsoft.com/office/drawing/2010/main" xmlns:ma14="http://schemas.microsoft.com/office/mac/drawingml/2011/main" val="1"/>
+              <ma14:wrappingTextBoxFlag xmlns:ma14="http://schemas.microsoft.com/office/mac/drawingml/2011/main" xmlns:a14="http://schemas.microsoft.com/office/drawing/2010/main" xmlns:m="http://schemas.openxmlformats.org/officeDocument/2006/math" xmlns="" val="1"/>
             </a:ext>
           </a:extLst>
         </p:spPr>
@@ -5133,7 +5107,7 @@
         </p:nvSpPr>
         <p:spPr>
           <a:xfrm>
-            <a:off x="207267" y="5952391"/>
+            <a:off x="129460" y="5873470"/>
             <a:ext cx="3025059" cy="4542188"/>
           </a:xfrm>
           <a:prstGeom prst="rect">
@@ -5153,7 +5127,7 @@
           </a:ln>
           <a:extLst>
             <a:ext uri="{C572A759-6A51-4108-AA02-DFA0A04FC94B}">
-              <ma14:wrappingTextBoxFlag xmlns="" xmlns:m="http://schemas.openxmlformats.org/officeDocument/2006/math" xmlns:a14="http://schemas.microsoft.com/office/drawing/2010/main" xmlns:ma14="http://schemas.microsoft.com/office/mac/drawingml/2011/main" val="1"/>
+              <ma14:wrappingTextBoxFlag xmlns:ma14="http://schemas.microsoft.com/office/mac/drawingml/2011/main" xmlns:a14="http://schemas.microsoft.com/office/drawing/2010/main" xmlns:m="http://schemas.openxmlformats.org/officeDocument/2006/math" xmlns="" val="1"/>
             </a:ext>
           </a:extLst>
         </p:spPr>
@@ -5365,7 +5339,25 @@
               <a:rPr lang="es-ES" dirty="0">
                 <a:latin typeface="Menlo"/>
               </a:rPr>
-              <a:t>number of additional observations (needed to ensure stationarity)</a:t>
+              <a:t>number of additional observations </a:t>
+            </a:r>
+            <a:r>
+              <a:rPr lang="es-ES" i="1" dirty="0" smtClean="0">
+                <a:latin typeface="Menlo"/>
+              </a:rPr>
+              <a:t>type</a:t>
+            </a:r>
+            <a:r>
+              <a:rPr lang="es-ES" dirty="0" smtClean="0">
+                <a:latin typeface="Menlo"/>
+              </a:rPr>
+              <a:t>: </a:t>
+            </a:r>
+            <a:r>
+              <a:rPr lang="es-ES" dirty="0">
+                <a:latin typeface="Menlo"/>
+              </a:rPr>
+              <a:t>estimation type (moment- or maximum likelihood-based)</a:t>
             </a:r>
           </a:p>
           <a:p>
@@ -5389,19 +5381,13 @@
               <a:rPr lang="es-ES" i="1" dirty="0" smtClean="0">
                 <a:latin typeface="Menlo"/>
               </a:rPr>
-              <a:t>type</a:t>
+              <a:t>distr</a:t>
             </a:r>
             <a:r>
               <a:rPr lang="es-ES" dirty="0" smtClean="0">
                 <a:latin typeface="Menlo"/>
               </a:rPr>
-              <a:t>: </a:t>
-            </a:r>
-            <a:r>
-              <a:rPr lang="es-ES" dirty="0">
-                <a:latin typeface="Menlo"/>
-              </a:rPr>
-              <a:t>estimation type (moment- or maximum likelihood-based)</a:t>
+              <a:t>: parametric family of distributions (Poisson, geometric or negative binomial)</a:t>
             </a:r>
           </a:p>
           <a:p>
@@ -5425,13 +5411,19 @@
               <a:rPr lang="es-ES" i="1" dirty="0" smtClean="0">
                 <a:latin typeface="Menlo"/>
               </a:rPr>
-              <a:t>distr</a:t>
+              <a:t>B</a:t>
             </a:r>
             <a:r>
               <a:rPr lang="es-ES" dirty="0" smtClean="0">
                 <a:latin typeface="Menlo"/>
               </a:rPr>
-              <a:t>: parametric family of distributions (Poisson, geometric or negative binomial)</a:t>
+              <a:t>: number of bootstrap </a:t>
+            </a:r>
+            <a:r>
+              <a:rPr lang="es-ES" dirty="0" smtClean="0">
+                <a:latin typeface="Menlo"/>
+              </a:rPr>
+              <a:t>replicates</a:t>
             </a:r>
           </a:p>
           <a:p>
@@ -5452,16 +5444,22 @@
               </a:defRPr>
             </a:pPr>
             <a:r>
-              <a:rPr lang="es-ES" i="1" dirty="0" smtClean="0">
+              <a:rPr lang="es-ES" i="1" dirty="0">
                 <a:latin typeface="Menlo"/>
               </a:rPr>
-              <a:t>B</a:t>
+              <a:t>setting</a:t>
+            </a:r>
+            <a:r>
+              <a:rPr lang="es-ES" dirty="0">
+                <a:latin typeface="Menlo"/>
+              </a:rPr>
+              <a:t>: semiparametric or </a:t>
             </a:r>
             <a:r>
               <a:rPr lang="es-ES" dirty="0" smtClean="0">
                 <a:latin typeface="Menlo"/>
               </a:rPr>
-              <a:t>: number of bootstrap replicates</a:t>
+              <a:t>parametric</a:t>
             </a:r>
           </a:p>
           <a:p>
@@ -5482,23 +5480,20 @@
               </a:defRPr>
             </a:pPr>
             <a:r>
-              <a:rPr lang="es-ES" i="1" dirty="0">
-                <a:latin typeface="Menlo"/>
-              </a:rPr>
-              <a:t>p</a:t>
-            </a:r>
-            <a:r>
               <a:rPr lang="es-ES" i="1" dirty="0" smtClean="0">
                 <a:latin typeface="Menlo"/>
               </a:rPr>
-              <a:t>enal1</a:t>
+              <a:t>M</a:t>
             </a:r>
             <a:r>
               <a:rPr lang="es-ES" dirty="0" smtClean="0">
                 <a:latin typeface="Menlo"/>
               </a:rPr>
-              <a:t> : L1 penalization parameter</a:t>
-            </a:r>
+              <a:t>: upper limit for innovations</a:t>
+            </a:r>
+            <a:endParaRPr lang="es-ES" dirty="0" smtClean="0">
+              <a:latin typeface="Menlo"/>
+            </a:endParaRPr>
           </a:p>
           <a:p>
             <a:pPr marL="171450" indent="-171450">
@@ -5527,13 +5522,13 @@
               <a:rPr lang="es-ES" i="1" dirty="0" smtClean="0">
                 <a:latin typeface="Menlo"/>
               </a:rPr>
-              <a:t>enal2</a:t>
+              <a:t>enal1</a:t>
             </a:r>
             <a:r>
               <a:rPr lang="es-ES" dirty="0" smtClean="0">
                 <a:latin typeface="Menlo"/>
               </a:rPr>
-              <a:t> : L2 penalization parameter</a:t>
+              <a:t> : L1 penalization parameter</a:t>
             </a:r>
           </a:p>
           <a:p>
@@ -5554,16 +5549,22 @@
               </a:defRPr>
             </a:pPr>
             <a:r>
+              <a:rPr lang="es-ES" i="1" dirty="0">
+                <a:latin typeface="Menlo"/>
+              </a:rPr>
+              <a:t>p</a:t>
+            </a:r>
+            <a:r>
               <a:rPr lang="es-ES" i="1" dirty="0" smtClean="0">
                 <a:latin typeface="Menlo"/>
               </a:rPr>
-              <a:t>validation</a:t>
+              <a:t>enal2</a:t>
             </a:r>
             <a:r>
               <a:rPr lang="es-ES" dirty="0" smtClean="0">
                 <a:latin typeface="Menlo"/>
               </a:rPr>
-              <a:t>: true or false whether validation is wanted</a:t>
+              <a:t> : L2 penalization parameter</a:t>
             </a:r>
           </a:p>
           <a:p>
@@ -5587,13 +5588,13 @@
               <a:rPr lang="es-ES" i="1" dirty="0" smtClean="0">
                 <a:latin typeface="Menlo"/>
               </a:rPr>
-              <a:t>over</a:t>
+              <a:t>validation</a:t>
             </a:r>
             <a:r>
               <a:rPr lang="es-ES" dirty="0" smtClean="0">
                 <a:latin typeface="Menlo"/>
               </a:rPr>
-              <a:t>: indicates whether validation over penal1, penal2 or both</a:t>
+              <a:t>: true or false whether validation is wanted</a:t>
             </a:r>
           </a:p>
           <a:p>
@@ -5614,22 +5615,16 @@
               </a:defRPr>
             </a:pPr>
             <a:r>
-              <a:rPr lang="es-ES" i="1" dirty="0">
-                <a:latin typeface="Menlo"/>
-              </a:rPr>
-              <a:t>i</a:t>
-            </a:r>
-            <a:r>
               <a:rPr lang="es-ES" i="1" dirty="0" smtClean="0">
                 <a:latin typeface="Menlo"/>
               </a:rPr>
-              <a:t>nit1</a:t>
+              <a:t>over</a:t>
             </a:r>
             <a:r>
               <a:rPr lang="es-ES" dirty="0" smtClean="0">
                 <a:latin typeface="Menlo"/>
               </a:rPr>
-              <a:t> : initial penal1 value</a:t>
+              <a:t>: indicates whether validation over penal1, penal2 or both</a:t>
             </a:r>
           </a:p>
           <a:p>
@@ -5659,13 +5654,13 @@
               <a:rPr lang="es-ES" i="1" dirty="0" smtClean="0">
                 <a:latin typeface="Menlo"/>
               </a:rPr>
-              <a:t>nit2</a:t>
+              <a:t>nit1</a:t>
             </a:r>
             <a:r>
               <a:rPr lang="es-ES" dirty="0" smtClean="0">
                 <a:latin typeface="Menlo"/>
               </a:rPr>
-              <a:t> : initial penal2 value</a:t>
+              <a:t> : initial penal1 value</a:t>
             </a:r>
           </a:p>
           <a:p>
@@ -5686,20 +5681,59 @@
               </a:defRPr>
             </a:pPr>
             <a:r>
+              <a:rPr lang="es-ES" i="1" dirty="0">
+                <a:latin typeface="Menlo"/>
+              </a:rPr>
+              <a:t>i</a:t>
+            </a:r>
+            <a:r>
               <a:rPr lang="es-ES" i="1" dirty="0" smtClean="0">
                 <a:latin typeface="Menlo"/>
               </a:rPr>
-              <a:t>folds</a:t>
+              <a:t>nit2</a:t>
             </a:r>
             <a:r>
               <a:rPr lang="es-ES" dirty="0" smtClean="0">
                 <a:latin typeface="Menlo"/>
               </a:rPr>
-              <a:t>:  number of folds in validation</a:t>
-            </a:r>
-            <a:endParaRPr lang="es-ES" dirty="0">
-              <a:latin typeface=""/>
-            </a:endParaRPr>
+              <a:t> : initial penal2 value</a:t>
+            </a:r>
+          </a:p>
+          <a:p>
+            <a:pPr marL="171450" indent="-171450">
+              <a:spcBef>
+                <a:spcPts val="0"/>
+              </a:spcBef>
+              <a:buFont typeface="Arial" panose="020B0604020202020204" pitchFamily="34" charset="0"/>
+              <a:buChar char="•"/>
+              <a:defRPr b="0">
+                <a:solidFill>
+                  <a:srgbClr val="000000"/>
+                </a:solidFill>
+                <a:latin typeface="Menlo"/>
+                <a:ea typeface="Menlo"/>
+                <a:cs typeface="Menlo"/>
+                <a:sym typeface="Menlo"/>
+              </a:defRPr>
+            </a:pPr>
+            <a:r>
+              <a:rPr lang="es-ES" i="1" dirty="0" smtClean="0">
+                <a:latin typeface="Menlo"/>
+              </a:rPr>
+              <a:t>folds</a:t>
+            </a:r>
+            <a:r>
+              <a:rPr lang="es-ES" dirty="0" smtClean="0">
+                <a:latin typeface="Menlo"/>
+              </a:rPr>
+              <a:t>:  number of folds in </a:t>
+            </a:r>
+            <a:r>
+              <a:rPr lang="es-ES" dirty="0" smtClean="0">
+                <a:latin typeface="Menlo"/>
+              </a:rPr>
+              <a:t>validation</a:t>
+            </a:r>
           </a:p>
         </p:txBody>
       </p:sp>
@@ -5731,7 +5765,7 @@
           <a:effectLst/>
           <a:extLst>
             <a:ext uri="{C572A759-6A51-4108-AA02-DFA0A04FC94B}">
-              <ma14:wrappingTextBoxFlag xmlns="" xmlns:m="http://schemas.openxmlformats.org/officeDocument/2006/math" xmlns:a14="http://schemas.microsoft.com/office/drawing/2010/main" xmlns:ma14="http://schemas.microsoft.com/office/mac/drawingml/2011/main" val="1"/>
+              <ma14:wrappingTextBoxFlag xmlns:ma14="http://schemas.microsoft.com/office/mac/drawingml/2011/main" xmlns:a14="http://schemas.microsoft.com/office/drawing/2010/main" xmlns:m="http://schemas.openxmlformats.org/officeDocument/2006/math" xmlns="" val="1"/>
             </a:ext>
           </a:extLst>
         </p:spPr>
@@ -5790,7 +5824,7 @@
           <a:effectLst/>
           <a:extLst>
             <a:ext uri="{C572A759-6A51-4108-AA02-DFA0A04FC94B}">
-              <ma14:wrappingTextBoxFlag xmlns="" xmlns:m="http://schemas.openxmlformats.org/officeDocument/2006/math" xmlns:a14="http://schemas.microsoft.com/office/drawing/2010/main" xmlns:ma14="http://schemas.microsoft.com/office/mac/drawingml/2011/main" val="1"/>
+              <ma14:wrappingTextBoxFlag xmlns:ma14="http://schemas.microsoft.com/office/mac/drawingml/2011/main" xmlns:a14="http://schemas.microsoft.com/office/drawing/2010/main" xmlns:m="http://schemas.openxmlformats.org/officeDocument/2006/math" xmlns="" val="1"/>
             </a:ext>
           </a:extLst>
         </p:spPr>
@@ -5815,11 +5849,7 @@
             </a:pPr>
             <a:r>
               <a:rPr lang="es-ES" sz="1600" dirty="0" smtClean="0"/>
-              <a:t> Semiparametric e</a:t>
-            </a:r>
-            <a:r>
-              <a:rPr lang="es-ES" sz="1600" dirty="0" smtClean="0"/>
-              <a:t>stimation of INAR(p) model</a:t>
+              <a:t> Semiparametric estimation of INAR(p) model</a:t>
             </a:r>
             <a:endParaRPr sz="1600" dirty="0"/>
           </a:p>
@@ -5850,7 +5880,7 @@
           </a:ln>
           <a:extLst>
             <a:ext uri="{C572A759-6A51-4108-AA02-DFA0A04FC94B}">
-              <ma14:wrappingTextBoxFlag xmlns="" xmlns:m="http://schemas.openxmlformats.org/officeDocument/2006/math" xmlns:a14="http://schemas.microsoft.com/office/drawing/2010/main" xmlns:ma14="http://schemas.microsoft.com/office/mac/drawingml/2011/main" val="1"/>
+              <ma14:wrappingTextBoxFlag xmlns:ma14="http://schemas.microsoft.com/office/mac/drawingml/2011/main" xmlns:a14="http://schemas.microsoft.com/office/drawing/2010/main" xmlns:m="http://schemas.openxmlformats.org/officeDocument/2006/math" xmlns="" val="1"/>
             </a:ext>
           </a:extLst>
         </p:spPr>
@@ -5921,7 +5951,7 @@
           <a:effectLst/>
           <a:extLst>
             <a:ext uri="{C572A759-6A51-4108-AA02-DFA0A04FC94B}">
-              <ma14:wrappingTextBoxFlag xmlns="" xmlns:m="http://schemas.openxmlformats.org/officeDocument/2006/math" xmlns:a14="http://schemas.microsoft.com/office/drawing/2010/main" xmlns:ma14="http://schemas.microsoft.com/office/mac/drawingml/2011/main" val="1"/>
+              <ma14:wrappingTextBoxFlag xmlns:ma14="http://schemas.microsoft.com/office/mac/drawingml/2011/main" xmlns:a14="http://schemas.microsoft.com/office/drawing/2010/main" xmlns:m="http://schemas.openxmlformats.org/officeDocument/2006/math" xmlns="" val="1"/>
             </a:ext>
           </a:extLst>
         </p:spPr>
@@ -6018,8 +6048,8 @@
         </p:nvSpPr>
         <p:spPr>
           <a:xfrm>
-            <a:off x="3817523" y="6575527"/>
-            <a:ext cx="6364457" cy="686973"/>
+            <a:off x="3817523" y="6477854"/>
+            <a:ext cx="6364457" cy="1087475"/>
           </a:xfrm>
           <a:prstGeom prst="rect">
             <a:avLst/>
@@ -6032,7 +6062,7 @@
           <a:effectLst/>
           <a:extLst>
             <a:ext uri="{C572A759-6A51-4108-AA02-DFA0A04FC94B}">
-              <ma14:wrappingTextBoxFlag xmlns="" xmlns:m="http://schemas.openxmlformats.org/officeDocument/2006/math" xmlns:a14="http://schemas.microsoft.com/office/drawing/2010/main" xmlns:ma14="http://schemas.microsoft.com/office/mac/drawingml/2011/main" val="1"/>
+              <ma14:wrappingTextBoxFlag xmlns:ma14="http://schemas.microsoft.com/office/mac/drawingml/2011/main" xmlns:a14="http://schemas.microsoft.com/office/drawing/2010/main" xmlns:m="http://schemas.openxmlformats.org/officeDocument/2006/math" xmlns="" val="1"/>
             </a:ext>
           </a:extLst>
         </p:spPr>
@@ -6062,41 +6092,105 @@
             <a:r>
               <a:rPr lang="en-US" sz="1400" b="0" dirty="0" smtClean="0">
                 <a:solidFill>
-                  <a:srgbClr val="FF0000"/>
+                  <a:srgbClr val="060606"/>
                 </a:solidFill>
                 <a:latin typeface="Source Sans Pro" panose="020B0503030403020204" pitchFamily="34" charset="0"/>
                 <a:ea typeface="Source Sans Pro" panose="020B0503030403020204" pitchFamily="34" charset="0"/>
               </a:rPr>
-              <a:t>performs the semiparametric INAR bootstrap procedure for given data, model order and number of replications</a:t>
-            </a:r>
-            <a:br>
+              <a:t>performs the </a:t>
+            </a:r>
+            <a:r>
               <a:rPr lang="en-US" sz="1400" b="0" dirty="0" smtClean="0">
                 <a:solidFill>
-                  <a:srgbClr val="FF0000"/>
+                  <a:srgbClr val="060606"/>
                 </a:solidFill>
                 <a:latin typeface="Source Sans Pro" panose="020B0503030403020204" pitchFamily="34" charset="0"/>
                 <a:ea typeface="Source Sans Pro" panose="020B0503030403020204" pitchFamily="34" charset="0"/>
               </a:rPr>
-            </a:br>
-            <a:r>
-              <a:rPr lang="en-US" sz="1400" dirty="0">
-                <a:solidFill>
-                  <a:schemeClr val="tx1"/>
+              <a:t>(semi)parametric </a:t>
+            </a:r>
+            <a:r>
+              <a:rPr lang="en-US" sz="1400" b="0" dirty="0" smtClean="0">
+                <a:solidFill>
+                  <a:srgbClr val="060606"/>
                 </a:solidFill>
                 <a:latin typeface="Source Sans Pro" panose="020B0503030403020204" pitchFamily="34" charset="0"/>
                 <a:ea typeface="Source Sans Pro" panose="020B0503030403020204" pitchFamily="34" charset="0"/>
               </a:rPr>
-              <a:t>O</a:t>
-            </a:r>
-            <a:r>
-              <a:rPr lang="en-US" sz="1400" dirty="0" smtClean="0">
-                <a:solidFill>
-                  <a:schemeClr val="tx1"/>
+              <a:t>INAR bootstrap procedure for given data, model </a:t>
+            </a:r>
+            <a:r>
+              <a:rPr lang="en-US" sz="1400" b="0" dirty="0" smtClean="0">
+                <a:solidFill>
+                  <a:srgbClr val="060606"/>
                 </a:solidFill>
                 <a:latin typeface="Source Sans Pro" panose="020B0503030403020204" pitchFamily="34" charset="0"/>
                 <a:ea typeface="Source Sans Pro" panose="020B0503030403020204" pitchFamily="34" charset="0"/>
               </a:rPr>
-              <a:t>utput</a:t>
+              <a:t>order, number </a:t>
+            </a:r>
+            <a:r>
+              <a:rPr lang="en-US" sz="1400" b="0" dirty="0" smtClean="0">
+                <a:solidFill>
+                  <a:srgbClr val="060606"/>
+                </a:solidFill>
+                <a:latin typeface="Source Sans Pro" panose="020B0503030403020204" pitchFamily="34" charset="0"/>
+                <a:ea typeface="Source Sans Pro" panose="020B0503030403020204" pitchFamily="34" charset="0"/>
+              </a:rPr>
+              <a:t>of </a:t>
+            </a:r>
+            <a:r>
+              <a:rPr lang="en-US" sz="1400" b="0" dirty="0" smtClean="0">
+                <a:solidFill>
+                  <a:srgbClr val="060606"/>
+                </a:solidFill>
+                <a:latin typeface="Source Sans Pro" panose="020B0503030403020204" pitchFamily="34" charset="0"/>
+                <a:ea typeface="Source Sans Pro" panose="020B0503030403020204" pitchFamily="34" charset="0"/>
+              </a:rPr>
+              <a:t>replications </a:t>
+            </a:r>
+            <a:r>
+              <a:rPr lang="en-US" sz="1400" b="0" dirty="0">
+                <a:solidFill>
+                  <a:srgbClr val="060606"/>
+                </a:solidFill>
+                <a:latin typeface="Source Sans Pro" panose="020B0503030403020204" pitchFamily="34" charset="0"/>
+                <a:ea typeface="Source Sans Pro" panose="020B0503030403020204" pitchFamily="34" charset="0"/>
+              </a:rPr>
+              <a:t>for a given parametric family of distribution (Poi, Geo or NB</a:t>
+            </a:r>
+            <a:r>
+              <a:rPr lang="en-US" sz="1400" b="0" dirty="0" smtClean="0">
+                <a:solidFill>
+                  <a:srgbClr val="060606"/>
+                </a:solidFill>
+                <a:latin typeface="Source Sans Pro" panose="020B0503030403020204" pitchFamily="34" charset="0"/>
+                <a:ea typeface="Source Sans Pro" panose="020B0503030403020204" pitchFamily="34" charset="0"/>
+              </a:rPr>
+              <a:t>) and estimation method.</a:t>
+            </a:r>
+            <a:r>
+              <a:rPr lang="en-US" sz="1400" b="0" dirty="0">
+                <a:latin typeface="Source Sans Pro" panose="020B0503030403020204" pitchFamily="34" charset="0"/>
+                <a:ea typeface="Source Sans Pro" panose="020B0503030403020204" pitchFamily="34" charset="0"/>
+              </a:rPr>
+              <a:t/>
+            </a:r>
+            <a:br>
+              <a:rPr lang="en-US" sz="1400" b="0" dirty="0">
+                <a:latin typeface="Source Sans Pro" panose="020B0503030403020204" pitchFamily="34" charset="0"/>
+                <a:ea typeface="Source Sans Pro" panose="020B0503030403020204" pitchFamily="34" charset="0"/>
+              </a:rPr>
+            </a:br>
+            <a:r>
+              <a:rPr lang="en-US" sz="1400" dirty="0" smtClean="0">
+                <a:solidFill>
+                  <a:schemeClr val="tx1"/>
+                </a:solidFill>
+                <a:latin typeface="Source Sans Pro" panose="020B0503030403020204" pitchFamily="34" charset="0"/>
+                <a:ea typeface="Source Sans Pro" panose="020B0503030403020204" pitchFamily="34" charset="0"/>
+              </a:rPr>
+              <a:t>Output</a:t>
             </a:r>
             <a:r>
               <a:rPr lang="en-US" sz="1400" b="0" dirty="0" smtClean="0">
@@ -6108,16 +6202,36 @@
             <a:r>
               <a:rPr lang="en-US" sz="1400" b="0" dirty="0" smtClean="0">
                 <a:solidFill>
-                  <a:srgbClr val="FF0000"/>
+                  <a:srgbClr val="060606"/>
                 </a:solidFill>
                 <a:latin typeface="Source Sans Pro" panose="020B0503030403020204" pitchFamily="34" charset="0"/>
                 <a:ea typeface="Source Sans Pro" panose="020B0503030403020204" pitchFamily="34" charset="0"/>
               </a:rPr>
-              <a:t>bootstrap estimated parameters: alpha and pmf</a:t>
+              <a:t>bootstrap estimated parameters: alpha and </a:t>
+            </a:r>
+            <a:r>
+              <a:rPr lang="en-US" sz="1400" b="0" dirty="0" err="1" smtClean="0">
+                <a:solidFill>
+                  <a:srgbClr val="060606"/>
+                </a:solidFill>
+                <a:latin typeface="Source Sans Pro" panose="020B0503030403020204" pitchFamily="34" charset="0"/>
+                <a:ea typeface="Source Sans Pro" panose="020B0503030403020204" pitchFamily="34" charset="0"/>
+              </a:rPr>
+              <a:t>pmf</a:t>
+            </a:r>
+            <a:r>
+              <a:rPr lang="en-US" sz="1400" b="0" dirty="0" smtClean="0">
+                <a:solidFill>
+                  <a:srgbClr val="060606"/>
+                </a:solidFill>
+                <a:latin typeface="Source Sans Pro" panose="020B0503030403020204" pitchFamily="34" charset="0"/>
+                <a:ea typeface="Source Sans Pro" panose="020B0503030403020204" pitchFamily="34" charset="0"/>
+              </a:rPr>
+              <a:t> or innovation parameters</a:t>
             </a:r>
             <a:endParaRPr lang="en-US" sz="1400" b="0" dirty="0">
               <a:solidFill>
-                <a:srgbClr val="FF0000"/>
+                <a:srgbClr val="060606"/>
               </a:solidFill>
               <a:latin typeface="Source Sans Pro" panose="020B0503030403020204" pitchFamily="34" charset="0"/>
               <a:ea typeface="Source Sans Pro" panose="020B0503030403020204" pitchFamily="34" charset="0"/>
@@ -6139,8 +6253,8 @@
         </p:nvSpPr>
         <p:spPr>
           <a:xfrm>
-            <a:off x="11805138" y="6538276"/>
-            <a:ext cx="1559459" cy="294872"/>
+            <a:off x="10410092" y="6538276"/>
+            <a:ext cx="2954505" cy="294872"/>
           </a:xfrm>
           <a:prstGeom prst="rect">
             <a:avLst/>
@@ -6156,7 +6270,7 @@
           </a:ln>
           <a:extLst>
             <a:ext uri="{C572A759-6A51-4108-AA02-DFA0A04FC94B}">
-              <ma14:wrappingTextBoxFlag xmlns="" xmlns:m="http://schemas.openxmlformats.org/officeDocument/2006/math" xmlns:a14="http://schemas.microsoft.com/office/drawing/2010/main" xmlns:ma14="http://schemas.microsoft.com/office/mac/drawingml/2011/main" val="1"/>
+              <ma14:wrappingTextBoxFlag xmlns:ma14="http://schemas.microsoft.com/office/mac/drawingml/2011/main" xmlns:a14="http://schemas.microsoft.com/office/drawing/2010/main" xmlns:m="http://schemas.openxmlformats.org/officeDocument/2006/math" xmlns="" val="1"/>
             </a:ext>
           </a:extLst>
         </p:spPr>
@@ -6183,35 +6297,40 @@
             <a:r>
               <a:rPr lang="es-ES" dirty="0" smtClean="0">
                 <a:solidFill>
-                  <a:srgbClr val="FF0000"/>
-                </a:solidFill>
-              </a:rPr>
-              <a:t>spinar</a:t>
+                  <a:schemeClr val="tx1"/>
+                </a:solidFill>
+              </a:rPr>
+              <a:t>spinar_boot</a:t>
+            </a:r>
+            <a:r>
+              <a:rPr dirty="0">
+                <a:solidFill>
+                  <a:schemeClr val="tx1"/>
+                </a:solidFill>
+              </a:rPr>
+              <a:t>(</a:t>
+            </a:r>
+            <a:r>
+              <a:rPr lang="es-ES" dirty="0">
+                <a:solidFill>
+                  <a:schemeClr val="tx1"/>
+                </a:solidFill>
+              </a:rPr>
+              <a:t>x, p, </a:t>
             </a:r>
             <a:r>
               <a:rPr lang="es-ES" dirty="0" smtClean="0">
                 <a:solidFill>
-                  <a:srgbClr val="FF0000"/>
-                </a:solidFill>
-              </a:rPr>
-              <a:t>_boot</a:t>
-            </a:r>
-            <a:r>
-              <a:rPr dirty="0">
-                <a:solidFill>
-                  <a:srgbClr val="FF0000"/>
-                </a:solidFill>
-              </a:rPr>
-              <a:t>(</a:t>
-            </a:r>
-            <a:r>
-              <a:rPr lang="es-ES" dirty="0">
-                <a:solidFill>
-                  <a:srgbClr val="FF0000"/>
-                </a:solidFill>
-              </a:rPr>
-              <a:t>x, p, B)</a:t>
-            </a:r>
+                  <a:schemeClr val="tx1"/>
+                </a:solidFill>
+              </a:rPr>
+              <a:t>B, setting, type, distr, M)</a:t>
+            </a:r>
+            <a:endParaRPr lang="es-ES" dirty="0">
+              <a:solidFill>
+                <a:schemeClr val="tx1"/>
+              </a:solidFill>
+            </a:endParaRPr>
           </a:p>
         </p:txBody>
       </p:sp>
@@ -6243,7 +6362,7 @@
           <a:effectLst/>
           <a:extLst>
             <a:ext uri="{C572A759-6A51-4108-AA02-DFA0A04FC94B}">
-              <ma14:wrappingTextBoxFlag xmlns="" xmlns:m="http://schemas.openxmlformats.org/officeDocument/2006/math" xmlns:a14="http://schemas.microsoft.com/office/drawing/2010/main" xmlns:ma14="http://schemas.microsoft.com/office/mac/drawingml/2011/main" val="1"/>
+              <ma14:wrappingTextBoxFlag xmlns:ma14="http://schemas.microsoft.com/office/mac/drawingml/2011/main" xmlns:a14="http://schemas.microsoft.com/office/drawing/2010/main" xmlns:m="http://schemas.openxmlformats.org/officeDocument/2006/math" xmlns="" val="1"/>
             </a:ext>
           </a:extLst>
         </p:spPr>
@@ -6364,7 +6483,7 @@
           <a:effectLst/>
           <a:extLst>
             <a:ext uri="{C572A759-6A51-4108-AA02-DFA0A04FC94B}">
-              <ma14:wrappingTextBoxFlag xmlns="" xmlns:m="http://schemas.openxmlformats.org/officeDocument/2006/math" xmlns:a14="http://schemas.microsoft.com/office/drawing/2010/main" xmlns:ma14="http://schemas.microsoft.com/office/mac/drawingml/2011/main" val="1"/>
+              <ma14:wrappingTextBoxFlag xmlns:ma14="http://schemas.microsoft.com/office/mac/drawingml/2011/main" xmlns:a14="http://schemas.microsoft.com/office/drawing/2010/main" xmlns:m="http://schemas.openxmlformats.org/officeDocument/2006/math" xmlns="" val="1"/>
             </a:ext>
           </a:extLst>
         </p:spPr>
@@ -6431,7 +6550,7 @@
           <a:effectLst/>
           <a:extLst>
             <a:ext uri="{C572A759-6A51-4108-AA02-DFA0A04FC94B}">
-              <ma14:wrappingTextBoxFlag xmlns="" xmlns:m="http://schemas.openxmlformats.org/officeDocument/2006/math" xmlns:a14="http://schemas.microsoft.com/office/drawing/2010/main" xmlns:ma14="http://schemas.microsoft.com/office/mac/drawingml/2011/main" val="1"/>
+              <ma14:wrappingTextBoxFlag xmlns:ma14="http://schemas.microsoft.com/office/mac/drawingml/2011/main" xmlns:a14="http://schemas.microsoft.com/office/drawing/2010/main" xmlns:m="http://schemas.openxmlformats.org/officeDocument/2006/math" xmlns="" val="1"/>
             </a:ext>
           </a:extLst>
         </p:spPr>
@@ -6550,7 +6669,7 @@
           </a:ln>
           <a:extLst>
             <a:ext uri="{C572A759-6A51-4108-AA02-DFA0A04FC94B}">
-              <ma14:wrappingTextBoxFlag xmlns="" xmlns:m="http://schemas.openxmlformats.org/officeDocument/2006/math" xmlns:a14="http://schemas.microsoft.com/office/drawing/2010/main" xmlns:ma14="http://schemas.microsoft.com/office/mac/drawingml/2011/main" val="1"/>
+              <ma14:wrappingTextBoxFlag xmlns:ma14="http://schemas.microsoft.com/office/mac/drawingml/2011/main" xmlns:a14="http://schemas.microsoft.com/office/drawing/2010/main" xmlns:m="http://schemas.openxmlformats.org/officeDocument/2006/math" xmlns="" val="1"/>
             </a:ext>
           </a:extLst>
         </p:spPr>
@@ -6613,7 +6732,7 @@
           <a:effectLst/>
           <a:extLst>
             <a:ext uri="{C572A759-6A51-4108-AA02-DFA0A04FC94B}">
-              <ma14:wrappingTextBoxFlag xmlns="" xmlns:m="http://schemas.openxmlformats.org/officeDocument/2006/math" xmlns:a14="http://schemas.microsoft.com/office/drawing/2010/main" xmlns:ma14="http://schemas.microsoft.com/office/mac/drawingml/2011/main" val="1"/>
+              <ma14:wrappingTextBoxFlag xmlns:ma14="http://schemas.microsoft.com/office/mac/drawingml/2011/main" xmlns:a14="http://schemas.microsoft.com/office/drawing/2010/main" xmlns:m="http://schemas.openxmlformats.org/officeDocument/2006/math" xmlns="" val="1"/>
             </a:ext>
           </a:extLst>
         </p:spPr>
@@ -6759,7 +6878,7 @@
           </a:ln>
           <a:extLst>
             <a:ext uri="{C572A759-6A51-4108-AA02-DFA0A04FC94B}">
-              <ma14:wrappingTextBoxFlag xmlns="" xmlns:m="http://schemas.openxmlformats.org/officeDocument/2006/math" xmlns:a14="http://schemas.microsoft.com/office/drawing/2010/main" xmlns:ma14="http://schemas.microsoft.com/office/mac/drawingml/2011/main" val="1"/>
+              <ma14:wrappingTextBoxFlag xmlns:ma14="http://schemas.microsoft.com/office/mac/drawingml/2011/main" xmlns:a14="http://schemas.microsoft.com/office/drawing/2010/main" xmlns:m="http://schemas.openxmlformats.org/officeDocument/2006/math" xmlns="" val="1"/>
             </a:ext>
           </a:extLst>
         </p:spPr>
@@ -6876,7 +6995,7 @@
           </a:ln>
           <a:extLst>
             <a:ext uri="{C572A759-6A51-4108-AA02-DFA0A04FC94B}">
-              <ma14:wrappingTextBoxFlag xmlns="" xmlns:m="http://schemas.openxmlformats.org/officeDocument/2006/math" xmlns:a14="http://schemas.microsoft.com/office/drawing/2010/main" xmlns:ma14="http://schemas.microsoft.com/office/mac/drawingml/2011/main" val="1"/>
+              <ma14:wrappingTextBoxFlag xmlns:ma14="http://schemas.microsoft.com/office/mac/drawingml/2011/main" xmlns:a14="http://schemas.microsoft.com/office/drawing/2010/main" xmlns:m="http://schemas.openxmlformats.org/officeDocument/2006/math" xmlns="" val="1"/>
             </a:ext>
           </a:extLst>
         </p:spPr>

</xml_diff>

<commit_message>
cheat sheet as pdf
</commit_message>
<xml_diff>
--- a/img_readme/cheat_sheet_spINAR.pptx
+++ b/img_readme/cheat_sheet_spINAR.pptx
@@ -2124,7 +2124,7 @@
           </a:ln>
           <a:extLst>
             <a:ext uri="{C572A759-6A51-4108-AA02-DFA0A04FC94B}">
-              <ma14:wrappingTextBoxFlag xmlns:ma14="http://schemas.microsoft.com/office/mac/drawingml/2011/main" xmlns:a14="http://schemas.microsoft.com/office/drawing/2010/main" xmlns:m="http://schemas.openxmlformats.org/officeDocument/2006/math" xmlns="" val="1"/>
+              <ma14:wrappingTextBoxFlag xmlns="" xmlns:m="http://schemas.openxmlformats.org/officeDocument/2006/math" xmlns:a14="http://schemas.microsoft.com/office/drawing/2010/main" xmlns:ma14="http://schemas.microsoft.com/office/mac/drawingml/2011/main" val="1"/>
             </a:ext>
           </a:extLst>
         </p:spPr>
@@ -2163,7 +2163,7 @@
           </a:ln>
           <a:extLst>
             <a:ext uri="{C572A759-6A51-4108-AA02-DFA0A04FC94B}">
-              <ma14:wrappingTextBoxFlag xmlns:ma14="http://schemas.microsoft.com/office/mac/drawingml/2011/main" xmlns:a14="http://schemas.microsoft.com/office/drawing/2010/main" xmlns:m="http://schemas.openxmlformats.org/officeDocument/2006/math" xmlns="" val="1"/>
+              <ma14:wrappingTextBoxFlag xmlns="" xmlns:m="http://schemas.openxmlformats.org/officeDocument/2006/math" xmlns:a14="http://schemas.microsoft.com/office/drawing/2010/main" xmlns:ma14="http://schemas.microsoft.com/office/mac/drawingml/2011/main" val="1"/>
             </a:ext>
           </a:extLst>
         </p:spPr>
@@ -3256,7 +3256,7 @@
           </a:ln>
           <a:extLst>
             <a:ext uri="{C572A759-6A51-4108-AA02-DFA0A04FC94B}">
-              <ma14:wrappingTextBoxFlag xmlns:ma14="http://schemas.microsoft.com/office/mac/drawingml/2011/main" xmlns:a14="http://schemas.microsoft.com/office/drawing/2010/main" xmlns:m="http://schemas.openxmlformats.org/officeDocument/2006/math" xmlns="" val="1"/>
+              <ma14:wrappingTextBoxFlag xmlns="" xmlns:m="http://schemas.openxmlformats.org/officeDocument/2006/math" xmlns:a14="http://schemas.microsoft.com/office/drawing/2010/main" xmlns:ma14="http://schemas.microsoft.com/office/mac/drawingml/2011/main" val="1"/>
             </a:ext>
           </a:extLst>
         </p:spPr>
@@ -3306,7 +3306,7 @@
           </a:ln>
           <a:extLst>
             <a:ext uri="{C572A759-6A51-4108-AA02-DFA0A04FC94B}">
-              <ma14:wrappingTextBoxFlag xmlns:ma14="http://schemas.microsoft.com/office/mac/drawingml/2011/main" xmlns:a14="http://schemas.microsoft.com/office/drawing/2010/main" xmlns:m="http://schemas.openxmlformats.org/officeDocument/2006/math" xmlns="" val="1"/>
+              <ma14:wrappingTextBoxFlag xmlns="" xmlns:m="http://schemas.openxmlformats.org/officeDocument/2006/math" xmlns:a14="http://schemas.microsoft.com/office/drawing/2010/main" xmlns:ma14="http://schemas.microsoft.com/office/mac/drawingml/2011/main" val="1"/>
             </a:ext>
           </a:extLst>
         </p:spPr>
@@ -3352,7 +3352,7 @@
           </a:ln>
           <a:extLst>
             <a:ext uri="{C572A759-6A51-4108-AA02-DFA0A04FC94B}">
-              <ma14:wrappingTextBoxFlag xmlns:ma14="http://schemas.microsoft.com/office/mac/drawingml/2011/main" xmlns:a14="http://schemas.microsoft.com/office/drawing/2010/main" xmlns:m="http://schemas.openxmlformats.org/officeDocument/2006/math" xmlns="" val="1"/>
+              <ma14:wrappingTextBoxFlag xmlns="" xmlns:m="http://schemas.openxmlformats.org/officeDocument/2006/math" xmlns:a14="http://schemas.microsoft.com/office/drawing/2010/main" xmlns:ma14="http://schemas.microsoft.com/office/mac/drawingml/2011/main" val="1"/>
             </a:ext>
           </a:extLst>
         </p:spPr>
@@ -3722,7 +3722,7 @@
           </a:ln>
           <a:extLst>
             <a:ext uri="{C572A759-6A51-4108-AA02-DFA0A04FC94B}">
-              <ma14:wrappingTextBoxFlag xmlns:ma14="http://schemas.microsoft.com/office/mac/drawingml/2011/main" xmlns:a14="http://schemas.microsoft.com/office/drawing/2010/main" xmlns:m="http://schemas.openxmlformats.org/officeDocument/2006/math" xmlns="" val="1"/>
+              <ma14:wrappingTextBoxFlag xmlns="" xmlns:m="http://schemas.openxmlformats.org/officeDocument/2006/math" xmlns:a14="http://schemas.microsoft.com/office/drawing/2010/main" xmlns:ma14="http://schemas.microsoft.com/office/mac/drawingml/2011/main" val="1"/>
             </a:ext>
           </a:extLst>
         </p:spPr>
@@ -3804,7 +3804,7 @@
           </a:ln>
           <a:extLst>
             <a:ext uri="{C572A759-6A51-4108-AA02-DFA0A04FC94B}">
-              <ma14:wrappingTextBoxFlag xmlns:ma14="http://schemas.microsoft.com/office/mac/drawingml/2011/main" xmlns:a14="http://schemas.microsoft.com/office/drawing/2010/main" xmlns:m="http://schemas.openxmlformats.org/officeDocument/2006/math" xmlns="" val="1"/>
+              <ma14:wrappingTextBoxFlag xmlns="" xmlns:m="http://schemas.openxmlformats.org/officeDocument/2006/math" xmlns:a14="http://schemas.microsoft.com/office/drawing/2010/main" xmlns:ma14="http://schemas.microsoft.com/office/mac/drawingml/2011/main" val="1"/>
             </a:ext>
           </a:extLst>
         </p:spPr>
@@ -3854,7 +3854,7 @@
           </a:ln>
           <a:extLst>
             <a:ext uri="{C572A759-6A51-4108-AA02-DFA0A04FC94B}">
-              <ma14:wrappingTextBoxFlag xmlns:ma14="http://schemas.microsoft.com/office/mac/drawingml/2011/main" xmlns:a14="http://schemas.microsoft.com/office/drawing/2010/main" xmlns:m="http://schemas.openxmlformats.org/officeDocument/2006/math" xmlns="" val="1"/>
+              <ma14:wrappingTextBoxFlag xmlns="" xmlns:m="http://schemas.openxmlformats.org/officeDocument/2006/math" xmlns:a14="http://schemas.microsoft.com/office/drawing/2010/main" xmlns:ma14="http://schemas.microsoft.com/office/mac/drawingml/2011/main" val="1"/>
             </a:ext>
           </a:extLst>
         </p:spPr>
@@ -3921,7 +3921,7 @@
           </a:ln>
           <a:extLst>
             <a:ext uri="{C572A759-6A51-4108-AA02-DFA0A04FC94B}">
-              <ma14:wrappingTextBoxFlag xmlns:ma14="http://schemas.microsoft.com/office/mac/drawingml/2011/main" xmlns:a14="http://schemas.microsoft.com/office/drawing/2010/main" xmlns:m="http://schemas.openxmlformats.org/officeDocument/2006/math" xmlns="" val="1"/>
+              <ma14:wrappingTextBoxFlag xmlns="" xmlns:m="http://schemas.openxmlformats.org/officeDocument/2006/math" xmlns:a14="http://schemas.microsoft.com/office/drawing/2010/main" xmlns:ma14="http://schemas.microsoft.com/office/mac/drawingml/2011/main" val="1"/>
             </a:ext>
           </a:extLst>
         </p:spPr>
@@ -4034,7 +4034,7 @@
           <a:effectLst/>
           <a:extLst>
             <a:ext uri="{C572A759-6A51-4108-AA02-DFA0A04FC94B}">
-              <ma14:wrappingTextBoxFlag xmlns:ma14="http://schemas.microsoft.com/office/mac/drawingml/2011/main" xmlns:a14="http://schemas.microsoft.com/office/drawing/2010/main" xmlns:m="http://schemas.openxmlformats.org/officeDocument/2006/math" xmlns="" val="1"/>
+              <ma14:wrappingTextBoxFlag xmlns="" xmlns:m="http://schemas.openxmlformats.org/officeDocument/2006/math" xmlns:a14="http://schemas.microsoft.com/office/drawing/2010/main" xmlns:ma14="http://schemas.microsoft.com/office/mac/drawingml/2011/main" val="1"/>
             </a:ext>
           </a:extLst>
         </p:spPr>
@@ -4144,7 +4144,7 @@
           </a:ln>
           <a:extLst>
             <a:ext uri="{C572A759-6A51-4108-AA02-DFA0A04FC94B}">
-              <ma14:wrappingTextBoxFlag xmlns:ma14="http://schemas.microsoft.com/office/mac/drawingml/2011/main" xmlns:a14="http://schemas.microsoft.com/office/drawing/2010/main" xmlns:m="http://schemas.openxmlformats.org/officeDocument/2006/math" xmlns="" val="1"/>
+              <ma14:wrappingTextBoxFlag xmlns="" xmlns:m="http://schemas.openxmlformats.org/officeDocument/2006/math" xmlns:a14="http://schemas.microsoft.com/office/drawing/2010/main" xmlns:ma14="http://schemas.microsoft.com/office/mac/drawingml/2011/main" val="1"/>
             </a:ext>
           </a:extLst>
         </p:spPr>
@@ -4200,7 +4200,7 @@
           </a:ln>
           <a:extLst>
             <a:ext uri="{C572A759-6A51-4108-AA02-DFA0A04FC94B}">
-              <ma14:wrappingTextBoxFlag xmlns:ma14="http://schemas.microsoft.com/office/mac/drawingml/2011/main" xmlns:a14="http://schemas.microsoft.com/office/drawing/2010/main" xmlns:m="http://schemas.openxmlformats.org/officeDocument/2006/math" xmlns="" val="1"/>
+              <ma14:wrappingTextBoxFlag xmlns="" xmlns:m="http://schemas.openxmlformats.org/officeDocument/2006/math" xmlns:a14="http://schemas.microsoft.com/office/drawing/2010/main" xmlns:ma14="http://schemas.microsoft.com/office/mac/drawingml/2011/main" val="1"/>
             </a:ext>
           </a:extLst>
         </p:spPr>
@@ -4256,7 +4256,7 @@
           </a:ln>
           <a:extLst>
             <a:ext uri="{C572A759-6A51-4108-AA02-DFA0A04FC94B}">
-              <ma14:wrappingTextBoxFlag xmlns:ma14="http://schemas.microsoft.com/office/mac/drawingml/2011/main" xmlns:a14="http://schemas.microsoft.com/office/drawing/2010/main" xmlns:m="http://schemas.openxmlformats.org/officeDocument/2006/math" xmlns="" val="1"/>
+              <ma14:wrappingTextBoxFlag xmlns="" xmlns:m="http://schemas.openxmlformats.org/officeDocument/2006/math" xmlns:a14="http://schemas.microsoft.com/office/drawing/2010/main" xmlns:ma14="http://schemas.microsoft.com/office/mac/drawingml/2011/main" val="1"/>
             </a:ext>
           </a:extLst>
         </p:spPr>
@@ -4343,7 +4343,7 @@
           <a:effectLst/>
           <a:extLst>
             <a:ext uri="{C572A759-6A51-4108-AA02-DFA0A04FC94B}">
-              <ma14:wrappingTextBoxFlag xmlns:ma14="http://schemas.microsoft.com/office/mac/drawingml/2011/main" xmlns:a14="http://schemas.microsoft.com/office/drawing/2010/main" xmlns:m="http://schemas.openxmlformats.org/officeDocument/2006/math" xmlns="" val="1"/>
+              <ma14:wrappingTextBoxFlag xmlns="" xmlns:m="http://schemas.openxmlformats.org/officeDocument/2006/math" xmlns:a14="http://schemas.microsoft.com/office/drawing/2010/main" xmlns:ma14="http://schemas.microsoft.com/office/mac/drawingml/2011/main" val="1"/>
             </a:ext>
           </a:extLst>
         </p:spPr>
@@ -4626,7 +4626,7 @@
           <a:effectLst/>
           <a:extLst>
             <a:ext uri="{C572A759-6A51-4108-AA02-DFA0A04FC94B}">
-              <ma14:wrappingTextBoxFlag xmlns:ma14="http://schemas.microsoft.com/office/mac/drawingml/2011/main" xmlns:a14="http://schemas.microsoft.com/office/drawing/2010/main" xmlns:m="http://schemas.openxmlformats.org/officeDocument/2006/math" xmlns="" val="1"/>
+              <ma14:wrappingTextBoxFlag xmlns="" xmlns:m="http://schemas.openxmlformats.org/officeDocument/2006/math" xmlns:a14="http://schemas.microsoft.com/office/drawing/2010/main" xmlns:ma14="http://schemas.microsoft.com/office/mac/drawingml/2011/main" val="1"/>
             </a:ext>
           </a:extLst>
         </p:spPr>
@@ -4720,7 +4720,7 @@
           <a:effectLst/>
           <a:extLst>
             <a:ext uri="{C572A759-6A51-4108-AA02-DFA0A04FC94B}">
-              <ma14:wrappingTextBoxFlag xmlns:ma14="http://schemas.microsoft.com/office/mac/drawingml/2011/main" xmlns:a14="http://schemas.microsoft.com/office/drawing/2010/main" xmlns:m="http://schemas.openxmlformats.org/officeDocument/2006/math" xmlns="" val="1"/>
+              <ma14:wrappingTextBoxFlag xmlns="" xmlns:m="http://schemas.openxmlformats.org/officeDocument/2006/math" xmlns:a14="http://schemas.microsoft.com/office/drawing/2010/main" xmlns:ma14="http://schemas.microsoft.com/office/mac/drawingml/2011/main" val="1"/>
             </a:ext>
           </a:extLst>
         </p:spPr>
@@ -4839,7 +4839,7 @@
           </a:ln>
           <a:extLst>
             <a:ext uri="{C572A759-6A51-4108-AA02-DFA0A04FC94B}">
-              <ma14:wrappingTextBoxFlag xmlns:ma14="http://schemas.microsoft.com/office/mac/drawingml/2011/main" xmlns:a14="http://schemas.microsoft.com/office/drawing/2010/main" xmlns:m="http://schemas.openxmlformats.org/officeDocument/2006/math" xmlns="" val="1"/>
+              <ma14:wrappingTextBoxFlag xmlns="" xmlns:m="http://schemas.openxmlformats.org/officeDocument/2006/math" xmlns:a14="http://schemas.microsoft.com/office/drawing/2010/main" xmlns:ma14="http://schemas.microsoft.com/office/mac/drawingml/2011/main" val="1"/>
             </a:ext>
           </a:extLst>
         </p:spPr>
@@ -4909,7 +4909,7 @@
           </a:ln>
           <a:extLst>
             <a:ext uri="{C572A759-6A51-4108-AA02-DFA0A04FC94B}">
-              <ma14:wrappingTextBoxFlag xmlns:ma14="http://schemas.microsoft.com/office/mac/drawingml/2011/main" xmlns:a14="http://schemas.microsoft.com/office/drawing/2010/main" xmlns:m="http://schemas.openxmlformats.org/officeDocument/2006/math" xmlns="" val="1"/>
+              <ma14:wrappingTextBoxFlag xmlns="" xmlns:m="http://schemas.openxmlformats.org/officeDocument/2006/math" xmlns:a14="http://schemas.microsoft.com/office/drawing/2010/main" xmlns:ma14="http://schemas.microsoft.com/office/mac/drawingml/2011/main" val="1"/>
             </a:ext>
           </a:extLst>
         </p:spPr>
@@ -5062,7 +5062,7 @@
           </a:ln>
           <a:extLst>
             <a:ext uri="{C572A759-6A51-4108-AA02-DFA0A04FC94B}">
-              <ma14:wrappingTextBoxFlag xmlns:ma14="http://schemas.microsoft.com/office/mac/drawingml/2011/main" xmlns:a14="http://schemas.microsoft.com/office/drawing/2010/main" xmlns:m="http://schemas.openxmlformats.org/officeDocument/2006/math" xmlns="" val="1"/>
+              <ma14:wrappingTextBoxFlag xmlns="" xmlns:m="http://schemas.openxmlformats.org/officeDocument/2006/math" xmlns:a14="http://schemas.microsoft.com/office/drawing/2010/main" xmlns:ma14="http://schemas.microsoft.com/office/mac/drawingml/2011/main" val="1"/>
             </a:ext>
           </a:extLst>
         </p:spPr>
@@ -5127,7 +5127,7 @@
           </a:ln>
           <a:extLst>
             <a:ext uri="{C572A759-6A51-4108-AA02-DFA0A04FC94B}">
-              <ma14:wrappingTextBoxFlag xmlns:ma14="http://schemas.microsoft.com/office/mac/drawingml/2011/main" xmlns:a14="http://schemas.microsoft.com/office/drawing/2010/main" xmlns:m="http://schemas.openxmlformats.org/officeDocument/2006/math" xmlns="" val="1"/>
+              <ma14:wrappingTextBoxFlag xmlns="" xmlns:m="http://schemas.openxmlformats.org/officeDocument/2006/math" xmlns:a14="http://schemas.microsoft.com/office/drawing/2010/main" xmlns:ma14="http://schemas.microsoft.com/office/mac/drawingml/2011/main" val="1"/>
             </a:ext>
           </a:extLst>
         </p:spPr>
@@ -5417,13 +5417,7 @@
               <a:rPr lang="es-ES" dirty="0" smtClean="0">
                 <a:latin typeface="Menlo"/>
               </a:rPr>
-              <a:t>: number of bootstrap </a:t>
-            </a:r>
-            <a:r>
-              <a:rPr lang="es-ES" dirty="0" smtClean="0">
-                <a:latin typeface="Menlo"/>
-              </a:rPr>
-              <a:t>replicates</a:t>
+              <a:t>: number of bootstrap replicates</a:t>
             </a:r>
           </a:p>
           <a:p>
@@ -5491,9 +5485,6 @@
               </a:rPr>
               <a:t>: upper limit for innovations</a:t>
             </a:r>
-            <a:endParaRPr lang="es-ES" dirty="0" smtClean="0">
-              <a:latin typeface="Menlo"/>
-            </a:endParaRPr>
           </a:p>
           <a:p>
             <a:pPr marL="171450" indent="-171450">
@@ -5726,13 +5717,7 @@
               <a:rPr lang="es-ES" dirty="0" smtClean="0">
                 <a:latin typeface="Menlo"/>
               </a:rPr>
-              <a:t>:  number of folds in </a:t>
-            </a:r>
-            <a:r>
-              <a:rPr lang="es-ES" dirty="0" smtClean="0">
-                <a:latin typeface="Menlo"/>
-              </a:rPr>
-              <a:t>validation</a:t>
+              <a:t>:  number of folds in validation</a:t>
             </a:r>
           </a:p>
         </p:txBody>
@@ -5765,7 +5750,7 @@
           <a:effectLst/>
           <a:extLst>
             <a:ext uri="{C572A759-6A51-4108-AA02-DFA0A04FC94B}">
-              <ma14:wrappingTextBoxFlag xmlns:ma14="http://schemas.microsoft.com/office/mac/drawingml/2011/main" xmlns:a14="http://schemas.microsoft.com/office/drawing/2010/main" xmlns:m="http://schemas.openxmlformats.org/officeDocument/2006/math" xmlns="" val="1"/>
+              <ma14:wrappingTextBoxFlag xmlns="" xmlns:m="http://schemas.openxmlformats.org/officeDocument/2006/math" xmlns:a14="http://schemas.microsoft.com/office/drawing/2010/main" xmlns:ma14="http://schemas.microsoft.com/office/mac/drawingml/2011/main" val="1"/>
             </a:ext>
           </a:extLst>
         </p:spPr>
@@ -5824,7 +5809,7 @@
           <a:effectLst/>
           <a:extLst>
             <a:ext uri="{C572A759-6A51-4108-AA02-DFA0A04FC94B}">
-              <ma14:wrappingTextBoxFlag xmlns:ma14="http://schemas.microsoft.com/office/mac/drawingml/2011/main" xmlns:a14="http://schemas.microsoft.com/office/drawing/2010/main" xmlns:m="http://schemas.openxmlformats.org/officeDocument/2006/math" xmlns="" val="1"/>
+              <ma14:wrappingTextBoxFlag xmlns="" xmlns:m="http://schemas.openxmlformats.org/officeDocument/2006/math" xmlns:a14="http://schemas.microsoft.com/office/drawing/2010/main" xmlns:ma14="http://schemas.microsoft.com/office/mac/drawingml/2011/main" val="1"/>
             </a:ext>
           </a:extLst>
         </p:spPr>
@@ -5880,7 +5865,7 @@
           </a:ln>
           <a:extLst>
             <a:ext uri="{C572A759-6A51-4108-AA02-DFA0A04FC94B}">
-              <ma14:wrappingTextBoxFlag xmlns:ma14="http://schemas.microsoft.com/office/mac/drawingml/2011/main" xmlns:a14="http://schemas.microsoft.com/office/drawing/2010/main" xmlns:m="http://schemas.openxmlformats.org/officeDocument/2006/math" xmlns="" val="1"/>
+              <ma14:wrappingTextBoxFlag xmlns="" xmlns:m="http://schemas.openxmlformats.org/officeDocument/2006/math" xmlns:a14="http://schemas.microsoft.com/office/drawing/2010/main" xmlns:ma14="http://schemas.microsoft.com/office/mac/drawingml/2011/main" val="1"/>
             </a:ext>
           </a:extLst>
         </p:spPr>
@@ -5951,7 +5936,7 @@
           <a:effectLst/>
           <a:extLst>
             <a:ext uri="{C572A759-6A51-4108-AA02-DFA0A04FC94B}">
-              <ma14:wrappingTextBoxFlag xmlns:ma14="http://schemas.microsoft.com/office/mac/drawingml/2011/main" xmlns:a14="http://schemas.microsoft.com/office/drawing/2010/main" xmlns:m="http://schemas.openxmlformats.org/officeDocument/2006/math" xmlns="" val="1"/>
+              <ma14:wrappingTextBoxFlag xmlns="" xmlns:m="http://schemas.openxmlformats.org/officeDocument/2006/math" xmlns:a14="http://schemas.microsoft.com/office/drawing/2010/main" xmlns:ma14="http://schemas.microsoft.com/office/mac/drawingml/2011/main" val="1"/>
             </a:ext>
           </a:extLst>
         </p:spPr>
@@ -6062,7 +6047,7 @@
           <a:effectLst/>
           <a:extLst>
             <a:ext uri="{C572A759-6A51-4108-AA02-DFA0A04FC94B}">
-              <ma14:wrappingTextBoxFlag xmlns:ma14="http://schemas.microsoft.com/office/mac/drawingml/2011/main" xmlns:a14="http://schemas.microsoft.com/office/drawing/2010/main" xmlns:m="http://schemas.openxmlformats.org/officeDocument/2006/math" xmlns="" val="1"/>
+              <ma14:wrappingTextBoxFlag xmlns="" xmlns:m="http://schemas.openxmlformats.org/officeDocument/2006/math" xmlns:a14="http://schemas.microsoft.com/office/drawing/2010/main" xmlns:ma14="http://schemas.microsoft.com/office/mac/drawingml/2011/main" val="1"/>
             </a:ext>
           </a:extLst>
         </p:spPr>
@@ -6097,17 +6082,17 @@
                 <a:latin typeface="Source Sans Pro" panose="020B0503030403020204" pitchFamily="34" charset="0"/>
                 <a:ea typeface="Source Sans Pro" panose="020B0503030403020204" pitchFamily="34" charset="0"/>
               </a:rPr>
-              <a:t>performs the </a:t>
-            </a:r>
-            <a:r>
-              <a:rPr lang="en-US" sz="1400" b="0" dirty="0" smtClean="0">
+              <a:t>performs the (semi)parametric INAR bootstrap procedure for given data, model order, number of replications </a:t>
+            </a:r>
+            <a:r>
+              <a:rPr lang="en-US" sz="1400" b="0" dirty="0">
                 <a:solidFill>
                   <a:srgbClr val="060606"/>
                 </a:solidFill>
                 <a:latin typeface="Source Sans Pro" panose="020B0503030403020204" pitchFamily="34" charset="0"/>
                 <a:ea typeface="Source Sans Pro" panose="020B0503030403020204" pitchFamily="34" charset="0"/>
               </a:rPr>
-              <a:t>(semi)parametric </a:t>
+              <a:t>for a given parametric family of distribution (Poi, Geo or NB</a:t>
             </a:r>
             <a:r>
               <a:rPr lang="en-US" sz="1400" b="0" dirty="0" smtClean="0">
@@ -6117,57 +6102,27 @@
                 <a:latin typeface="Source Sans Pro" panose="020B0503030403020204" pitchFamily="34" charset="0"/>
                 <a:ea typeface="Source Sans Pro" panose="020B0503030403020204" pitchFamily="34" charset="0"/>
               </a:rPr>
-              <a:t>INAR bootstrap procedure for given data, model </a:t>
-            </a:r>
-            <a:r>
-              <a:rPr lang="en-US" sz="1400" b="0" dirty="0" smtClean="0">
+              <a:t>) and </a:t>
+            </a:r>
+            <a:r>
+              <a:rPr lang="en-US" sz="1400" b="0" smtClean="0">
                 <a:solidFill>
                   <a:srgbClr val="060606"/>
                 </a:solidFill>
                 <a:latin typeface="Source Sans Pro" panose="020B0503030403020204" pitchFamily="34" charset="0"/>
                 <a:ea typeface="Source Sans Pro" panose="020B0503030403020204" pitchFamily="34" charset="0"/>
               </a:rPr>
-              <a:t>order, number </a:t>
-            </a:r>
-            <a:r>
-              <a:rPr lang="en-US" sz="1400" b="0" dirty="0" smtClean="0">
+              <a:t>estimation </a:t>
+            </a:r>
+            <a:r>
+              <a:rPr lang="en-US" sz="1400" b="0" smtClean="0">
                 <a:solidFill>
                   <a:srgbClr val="060606"/>
                 </a:solidFill>
                 <a:latin typeface="Source Sans Pro" panose="020B0503030403020204" pitchFamily="34" charset="0"/>
                 <a:ea typeface="Source Sans Pro" panose="020B0503030403020204" pitchFamily="34" charset="0"/>
               </a:rPr>
-              <a:t>of </a:t>
-            </a:r>
-            <a:r>
-              <a:rPr lang="en-US" sz="1400" b="0" dirty="0" smtClean="0">
-                <a:solidFill>
-                  <a:srgbClr val="060606"/>
-                </a:solidFill>
-                <a:latin typeface="Source Sans Pro" panose="020B0503030403020204" pitchFamily="34" charset="0"/>
-                <a:ea typeface="Source Sans Pro" panose="020B0503030403020204" pitchFamily="34" charset="0"/>
-              </a:rPr>
-              <a:t>replications </a:t>
-            </a:r>
-            <a:r>
-              <a:rPr lang="en-US" sz="1400" b="0" dirty="0">
-                <a:solidFill>
-                  <a:srgbClr val="060606"/>
-                </a:solidFill>
-                <a:latin typeface="Source Sans Pro" panose="020B0503030403020204" pitchFamily="34" charset="0"/>
-                <a:ea typeface="Source Sans Pro" panose="020B0503030403020204" pitchFamily="34" charset="0"/>
-              </a:rPr>
-              <a:t>for a given parametric family of distribution (Poi, Geo or NB</a:t>
-            </a:r>
-            <a:r>
-              <a:rPr lang="en-US" sz="1400" b="0" dirty="0" smtClean="0">
-                <a:solidFill>
-                  <a:srgbClr val="060606"/>
-                </a:solidFill>
-                <a:latin typeface="Source Sans Pro" panose="020B0503030403020204" pitchFamily="34" charset="0"/>
-                <a:ea typeface="Source Sans Pro" panose="020B0503030403020204" pitchFamily="34" charset="0"/>
-              </a:rPr>
-              <a:t>) and estimation method.</a:t>
+              <a:t>method</a:t>
             </a:r>
             <a:r>
               <a:rPr lang="en-US" sz="1400" b="0" dirty="0">
@@ -6270,7 +6225,7 @@
           </a:ln>
           <a:extLst>
             <a:ext uri="{C572A759-6A51-4108-AA02-DFA0A04FC94B}">
-              <ma14:wrappingTextBoxFlag xmlns:ma14="http://schemas.microsoft.com/office/mac/drawingml/2011/main" xmlns:a14="http://schemas.microsoft.com/office/drawing/2010/main" xmlns:m="http://schemas.openxmlformats.org/officeDocument/2006/math" xmlns="" val="1"/>
+              <ma14:wrappingTextBoxFlag xmlns="" xmlns:m="http://schemas.openxmlformats.org/officeDocument/2006/math" xmlns:a14="http://schemas.microsoft.com/office/drawing/2010/main" xmlns:ma14="http://schemas.microsoft.com/office/mac/drawingml/2011/main" val="1"/>
             </a:ext>
           </a:extLst>
         </p:spPr>
@@ -6362,7 +6317,7 @@
           <a:effectLst/>
           <a:extLst>
             <a:ext uri="{C572A759-6A51-4108-AA02-DFA0A04FC94B}">
-              <ma14:wrappingTextBoxFlag xmlns:ma14="http://schemas.microsoft.com/office/mac/drawingml/2011/main" xmlns:a14="http://schemas.microsoft.com/office/drawing/2010/main" xmlns:m="http://schemas.openxmlformats.org/officeDocument/2006/math" xmlns="" val="1"/>
+              <ma14:wrappingTextBoxFlag xmlns="" xmlns:m="http://schemas.openxmlformats.org/officeDocument/2006/math" xmlns:a14="http://schemas.microsoft.com/office/drawing/2010/main" xmlns:ma14="http://schemas.microsoft.com/office/mac/drawingml/2011/main" val="1"/>
             </a:ext>
           </a:extLst>
         </p:spPr>
@@ -6483,7 +6438,7 @@
           <a:effectLst/>
           <a:extLst>
             <a:ext uri="{C572A759-6A51-4108-AA02-DFA0A04FC94B}">
-              <ma14:wrappingTextBoxFlag xmlns:ma14="http://schemas.microsoft.com/office/mac/drawingml/2011/main" xmlns:a14="http://schemas.microsoft.com/office/drawing/2010/main" xmlns:m="http://schemas.openxmlformats.org/officeDocument/2006/math" xmlns="" val="1"/>
+              <ma14:wrappingTextBoxFlag xmlns="" xmlns:m="http://schemas.openxmlformats.org/officeDocument/2006/math" xmlns:a14="http://schemas.microsoft.com/office/drawing/2010/main" xmlns:ma14="http://schemas.microsoft.com/office/mac/drawingml/2011/main" val="1"/>
             </a:ext>
           </a:extLst>
         </p:spPr>
@@ -6550,7 +6505,7 @@
           <a:effectLst/>
           <a:extLst>
             <a:ext uri="{C572A759-6A51-4108-AA02-DFA0A04FC94B}">
-              <ma14:wrappingTextBoxFlag xmlns:ma14="http://schemas.microsoft.com/office/mac/drawingml/2011/main" xmlns:a14="http://schemas.microsoft.com/office/drawing/2010/main" xmlns:m="http://schemas.openxmlformats.org/officeDocument/2006/math" xmlns="" val="1"/>
+              <ma14:wrappingTextBoxFlag xmlns="" xmlns:m="http://schemas.openxmlformats.org/officeDocument/2006/math" xmlns:a14="http://schemas.microsoft.com/office/drawing/2010/main" xmlns:ma14="http://schemas.microsoft.com/office/mac/drawingml/2011/main" val="1"/>
             </a:ext>
           </a:extLst>
         </p:spPr>
@@ -6669,7 +6624,7 @@
           </a:ln>
           <a:extLst>
             <a:ext uri="{C572A759-6A51-4108-AA02-DFA0A04FC94B}">
-              <ma14:wrappingTextBoxFlag xmlns:ma14="http://schemas.microsoft.com/office/mac/drawingml/2011/main" xmlns:a14="http://schemas.microsoft.com/office/drawing/2010/main" xmlns:m="http://schemas.openxmlformats.org/officeDocument/2006/math" xmlns="" val="1"/>
+              <ma14:wrappingTextBoxFlag xmlns="" xmlns:m="http://schemas.openxmlformats.org/officeDocument/2006/math" xmlns:a14="http://schemas.microsoft.com/office/drawing/2010/main" xmlns:ma14="http://schemas.microsoft.com/office/mac/drawingml/2011/main" val="1"/>
             </a:ext>
           </a:extLst>
         </p:spPr>
@@ -6732,7 +6687,7 @@
           <a:effectLst/>
           <a:extLst>
             <a:ext uri="{C572A759-6A51-4108-AA02-DFA0A04FC94B}">
-              <ma14:wrappingTextBoxFlag xmlns:ma14="http://schemas.microsoft.com/office/mac/drawingml/2011/main" xmlns:a14="http://schemas.microsoft.com/office/drawing/2010/main" xmlns:m="http://schemas.openxmlformats.org/officeDocument/2006/math" xmlns="" val="1"/>
+              <ma14:wrappingTextBoxFlag xmlns="" xmlns:m="http://schemas.openxmlformats.org/officeDocument/2006/math" xmlns:a14="http://schemas.microsoft.com/office/drawing/2010/main" xmlns:ma14="http://schemas.microsoft.com/office/mac/drawingml/2011/main" val="1"/>
             </a:ext>
           </a:extLst>
         </p:spPr>
@@ -6878,7 +6833,7 @@
           </a:ln>
           <a:extLst>
             <a:ext uri="{C572A759-6A51-4108-AA02-DFA0A04FC94B}">
-              <ma14:wrappingTextBoxFlag xmlns:ma14="http://schemas.microsoft.com/office/mac/drawingml/2011/main" xmlns:a14="http://schemas.microsoft.com/office/drawing/2010/main" xmlns:m="http://schemas.openxmlformats.org/officeDocument/2006/math" xmlns="" val="1"/>
+              <ma14:wrappingTextBoxFlag xmlns="" xmlns:m="http://schemas.openxmlformats.org/officeDocument/2006/math" xmlns:a14="http://schemas.microsoft.com/office/drawing/2010/main" xmlns:ma14="http://schemas.microsoft.com/office/mac/drawingml/2011/main" val="1"/>
             </a:ext>
           </a:extLst>
         </p:spPr>
@@ -6995,7 +6950,7 @@
           </a:ln>
           <a:extLst>
             <a:ext uri="{C572A759-6A51-4108-AA02-DFA0A04FC94B}">
-              <ma14:wrappingTextBoxFlag xmlns:ma14="http://schemas.microsoft.com/office/mac/drawingml/2011/main" xmlns:a14="http://schemas.microsoft.com/office/drawing/2010/main" xmlns:m="http://schemas.openxmlformats.org/officeDocument/2006/math" xmlns="" val="1"/>
+              <ma14:wrappingTextBoxFlag xmlns="" xmlns:m="http://schemas.openxmlformats.org/officeDocument/2006/math" xmlns:a14="http://schemas.microsoft.com/office/drawing/2010/main" xmlns:ma14="http://schemas.microsoft.com/office/mac/drawingml/2011/main" val="1"/>
             </a:ext>
           </a:extLst>
         </p:spPr>
@@ -7104,6 +7059,13 @@
     <a:masterClrMapping/>
   </p:clrMapOvr>
   <p:transition spd="med"/>
+  <p:timing>
+    <p:tnLst>
+      <p:par>
+        <p:cTn id="1" dur="indefinite" restart="never" nodeType="tmRoot"/>
+      </p:par>
+    </p:tnLst>
+  </p:timing>
 </p:sld>
 </file>
 

</xml_diff>